<commit_message>
Add JHE paper to Lecture 7
</commit_message>
<xml_diff>
--- a/Lecture06_IV/Lecture6_IVEstimation_2022F.pptx
+++ b/Lecture06_IV/Lecture6_IVEstimation_2022F.pptx
@@ -285,7 +285,7 @@
           <a:p>
             <a:fld id="{EF911157-0FC2-4F06-8D61-FD647FE4E19D}" type="datetimeFigureOut">
               <a:rPr lang="en-US" smtClean="0"/>
-              <a:t>10/20/2022</a:t>
+              <a:t>10/21/2022</a:t>
             </a:fld>
             <a:endParaRPr lang="en-US"/>
           </a:p>
@@ -607,13 +607,16 @@
             </a:pPr>
             <a:r>
               <a:rPr lang="en-US" dirty="0"/>
-              <a:t>Note that this won’t be a coding heavy day, but an </a:t>
+              <a:t>FOR NEXT TIME: MOVE LATE STUFF MUCH EARLIER, </a:t>
             </a:r>
             <a:r>
               <a:rPr lang="en-US"/>
-              <a:t>intuition heavy day</a:t>
-            </a:r>
-            <a:endParaRPr lang="en-US" dirty="0"/>
+              <a:t>SCRAP GMM. Note </a:t>
+            </a:r>
+            <a:r>
+              <a:rPr lang="en-US" dirty="0"/>
+              <a:t>that this won’t be a coding heavy day, but an intuition heavy day. </a:t>
+            </a:r>
           </a:p>
         </p:txBody>
       </p:sp>
@@ -6574,7 +6577,7 @@
             <a:fld id="{0972D05C-DCFB-4BB6-B49C-AC126BF3ED2C}" type="datetimeFigureOut">
               <a:rPr lang="en-US" smtClean="0"/>
               <a:pPr/>
-              <a:t>10/20/2022</a:t>
+              <a:t>10/21/2022</a:t>
             </a:fld>
             <a:endParaRPr lang="en-US"/>
           </a:p>
@@ -6804,7 +6807,7 @@
             <a:fld id="{0972D05C-DCFB-4BB6-B49C-AC126BF3ED2C}" type="datetimeFigureOut">
               <a:rPr lang="en-US" smtClean="0"/>
               <a:pPr/>
-              <a:t>10/20/2022</a:t>
+              <a:t>10/21/2022</a:t>
             </a:fld>
             <a:endParaRPr lang="en-US"/>
           </a:p>
@@ -6986,7 +6989,7 @@
             <a:fld id="{0972D05C-DCFB-4BB6-B49C-AC126BF3ED2C}" type="datetimeFigureOut">
               <a:rPr lang="en-US" smtClean="0"/>
               <a:pPr/>
-              <a:t>10/20/2022</a:t>
+              <a:t>10/21/2022</a:t>
             </a:fld>
             <a:endParaRPr lang="en-US"/>
           </a:p>
@@ -7158,7 +7161,7 @@
             <a:fld id="{0972D05C-DCFB-4BB6-B49C-AC126BF3ED2C}" type="datetimeFigureOut">
               <a:rPr lang="en-US" smtClean="0"/>
               <a:pPr/>
-              <a:t>10/20/2022</a:t>
+              <a:t>10/21/2022</a:t>
             </a:fld>
             <a:endParaRPr lang="en-US"/>
           </a:p>
@@ -7414,7 +7417,7 @@
             <a:fld id="{0972D05C-DCFB-4BB6-B49C-AC126BF3ED2C}" type="datetimeFigureOut">
               <a:rPr lang="en-US" smtClean="0"/>
               <a:pPr/>
-              <a:t>10/20/2022</a:t>
+              <a:t>10/21/2022</a:t>
             </a:fld>
             <a:endParaRPr lang="en-US"/>
           </a:p>
@@ -7742,7 +7745,7 @@
             <a:fld id="{0972D05C-DCFB-4BB6-B49C-AC126BF3ED2C}" type="datetimeFigureOut">
               <a:rPr lang="en-US" smtClean="0"/>
               <a:pPr/>
-              <a:t>10/20/2022</a:t>
+              <a:t>10/21/2022</a:t>
             </a:fld>
             <a:endParaRPr lang="en-US"/>
           </a:p>
@@ -8195,7 +8198,7 @@
             <a:fld id="{0972D05C-DCFB-4BB6-B49C-AC126BF3ED2C}" type="datetimeFigureOut">
               <a:rPr lang="en-US" smtClean="0"/>
               <a:pPr/>
-              <a:t>10/20/2022</a:t>
+              <a:t>10/21/2022</a:t>
             </a:fld>
             <a:endParaRPr lang="en-US"/>
           </a:p>
@@ -8315,7 +8318,7 @@
             <a:fld id="{0972D05C-DCFB-4BB6-B49C-AC126BF3ED2C}" type="datetimeFigureOut">
               <a:rPr lang="en-US" smtClean="0"/>
               <a:pPr/>
-              <a:t>10/20/2022</a:t>
+              <a:t>10/21/2022</a:t>
             </a:fld>
             <a:endParaRPr lang="en-US"/>
           </a:p>
@@ -8412,7 +8415,7 @@
             <a:fld id="{0972D05C-DCFB-4BB6-B49C-AC126BF3ED2C}" type="datetimeFigureOut">
               <a:rPr lang="en-US" smtClean="0"/>
               <a:pPr/>
-              <a:t>10/20/2022</a:t>
+              <a:t>10/21/2022</a:t>
             </a:fld>
             <a:endParaRPr lang="en-US"/>
           </a:p>
@@ -8701,7 +8704,7 @@
             <a:fld id="{0972D05C-DCFB-4BB6-B49C-AC126BF3ED2C}" type="datetimeFigureOut">
               <a:rPr lang="en-US" smtClean="0"/>
               <a:pPr/>
-              <a:t>10/20/2022</a:t>
+              <a:t>10/21/2022</a:t>
             </a:fld>
             <a:endParaRPr lang="en-US"/>
           </a:p>
@@ -9025,7 +9028,7 @@
             <a:fld id="{0972D05C-DCFB-4BB6-B49C-AC126BF3ED2C}" type="datetimeFigureOut">
               <a:rPr lang="en-US" smtClean="0"/>
               <a:pPr/>
-              <a:t>10/20/2022</a:t>
+              <a:t>10/21/2022</a:t>
             </a:fld>
             <a:endParaRPr lang="en-US"/>
           </a:p>
@@ -9280,7 +9283,7 @@
             <a:fld id="{0972D05C-DCFB-4BB6-B49C-AC126BF3ED2C}" type="datetimeFigureOut">
               <a:rPr lang="en-US" smtClean="0"/>
               <a:pPr/>
-              <a:t>10/20/2022</a:t>
+              <a:t>10/21/2022</a:t>
             </a:fld>
             <a:endParaRPr lang="en-US" dirty="0"/>
           </a:p>

</xml_diff>